<commit_message>
Update Population Density Relationship Analysis.pptx
</commit_message>
<xml_diff>
--- a/Population Density Relationship Analysis.pptx
+++ b/Population Density Relationship Analysis.pptx
@@ -11428,7 +11428,7 @@
           <a:lstStyle/>
           <a:p>
             <a:r>
-              <a:rPr lang="en-US">
+              <a:rPr lang="en-US" dirty="0">
                 <a:ea typeface="+mn-lt"/>
                 <a:cs typeface="+mn-lt"/>
               </a:rPr>
@@ -11566,10 +11566,10 @@
       </p:sp>
       <p:pic>
         <p:nvPicPr>
-          <p:cNvPr id="3" name="Picture 4" descr="Chart, scatter chart&#10;&#10;Description automatically generated">
-            <a:extLst>
-              <a:ext uri="{FF2B5EF4-FFF2-40B4-BE49-F238E27FC236}">
-                <a16:creationId xmlns:a16="http://schemas.microsoft.com/office/drawing/2014/main" id="{A27F875D-AF89-1C58-2DD6-72391BDE1693}"/>
+          <p:cNvPr id="6" name="Picture 5" descr="Chart, scatter chart&#10;&#10;Description automatically generated">
+            <a:extLst>
+              <a:ext uri="{FF2B5EF4-FFF2-40B4-BE49-F238E27FC236}">
+                <a16:creationId xmlns:a16="http://schemas.microsoft.com/office/drawing/2014/main" id="{9FA2C22D-92FA-B76C-BA07-3086731C07B1}"/>
               </a:ext>
             </a:extLst>
           </p:cNvPr>
@@ -11586,8 +11586,8 @@
         </p:blipFill>
         <p:spPr>
           <a:xfrm>
-            <a:off x="1207271" y="1780187"/>
-            <a:ext cx="4886325" cy="4072595"/>
+            <a:off x="652400" y="1794112"/>
+            <a:ext cx="4906735" cy="4096209"/>
           </a:xfrm>
           <a:prstGeom prst="rect">
             <a:avLst/>
@@ -11596,10 +11596,10 @@
       </p:pic>
       <p:pic>
         <p:nvPicPr>
-          <p:cNvPr id="5" name="Picture 5" descr="Chart, scatter chart&#10;&#10;Description automatically generated">
-            <a:extLst>
-              <a:ext uri="{FF2B5EF4-FFF2-40B4-BE49-F238E27FC236}">
-                <a16:creationId xmlns:a16="http://schemas.microsoft.com/office/drawing/2014/main" id="{2C31A573-4BE1-B315-3229-D5872E566F81}"/>
+          <p:cNvPr id="9" name="Picture 8" descr="Chart, scatter chart&#10;&#10;Description automatically generated">
+            <a:extLst>
+              <a:ext uri="{FF2B5EF4-FFF2-40B4-BE49-F238E27FC236}">
+                <a16:creationId xmlns:a16="http://schemas.microsoft.com/office/drawing/2014/main" id="{E792413E-E086-D721-3939-A3B723263357}"/>
               </a:ext>
             </a:extLst>
           </p:cNvPr>
@@ -11616,8 +11616,8 @@
         </p:blipFill>
         <p:spPr>
           <a:xfrm>
-            <a:off x="6091917" y="1794112"/>
-            <a:ext cx="4906735" cy="4079399"/>
+            <a:off x="6244586" y="1794112"/>
+            <a:ext cx="4906735" cy="4096209"/>
           </a:xfrm>
           <a:prstGeom prst="rect">
             <a:avLst/>
@@ -11681,7 +11681,7 @@
           <a:lstStyle/>
           <a:p>
             <a:r>
-              <a:rPr lang="en-US">
+              <a:rPr lang="en-US" dirty="0">
                 <a:ea typeface="+mn-lt"/>
                 <a:cs typeface="+mn-lt"/>
               </a:rPr>
@@ -11819,10 +11819,10 @@
       </p:sp>
       <p:pic>
         <p:nvPicPr>
-          <p:cNvPr id="3" name="Picture 4" descr="Chart, scatter chart&#10;&#10;Description automatically generated">
-            <a:extLst>
-              <a:ext uri="{FF2B5EF4-FFF2-40B4-BE49-F238E27FC236}">
-                <a16:creationId xmlns:a16="http://schemas.microsoft.com/office/drawing/2014/main" id="{D27119C9-9869-6D32-D2E2-C6B1A2E70981}"/>
+          <p:cNvPr id="6" name="Picture 5" descr="Chart, scatter chart&#10;&#10;Description automatically generated">
+            <a:extLst>
+              <a:ext uri="{FF2B5EF4-FFF2-40B4-BE49-F238E27FC236}">
+                <a16:creationId xmlns:a16="http://schemas.microsoft.com/office/drawing/2014/main" id="{A5D36974-4FAE-7D0D-DA1D-A071E93E501E}"/>
               </a:ext>
             </a:extLst>
           </p:cNvPr>
@@ -11839,8 +11839,8 @@
         </p:blipFill>
         <p:spPr>
           <a:xfrm>
-            <a:off x="1213213" y="1789287"/>
-            <a:ext cx="4879648" cy="4063312"/>
+            <a:off x="710365" y="1792716"/>
+            <a:ext cx="4875857" cy="4070432"/>
           </a:xfrm>
           <a:prstGeom prst="rect">
             <a:avLst/>
@@ -11849,10 +11849,10 @@
       </p:pic>
       <p:pic>
         <p:nvPicPr>
-          <p:cNvPr id="5" name="Picture 5" descr="Chart, scatter chart&#10;&#10;Description automatically generated">
-            <a:extLst>
-              <a:ext uri="{FF2B5EF4-FFF2-40B4-BE49-F238E27FC236}">
-                <a16:creationId xmlns:a16="http://schemas.microsoft.com/office/drawing/2014/main" id="{C6BA5DB9-7AA6-A7A5-9C81-4AB605BB47BA}"/>
+          <p:cNvPr id="9" name="Picture 8" descr="Chart, scatter chart&#10;&#10;Description automatically generated">
+            <a:extLst>
+              <a:ext uri="{FF2B5EF4-FFF2-40B4-BE49-F238E27FC236}">
+                <a16:creationId xmlns:a16="http://schemas.microsoft.com/office/drawing/2014/main" id="{2374A03C-909E-23E3-4385-E8BDDADEE377}"/>
               </a:ext>
             </a:extLst>
           </p:cNvPr>
@@ -11869,8 +11869,8 @@
         </p:blipFill>
         <p:spPr>
           <a:xfrm>
-            <a:off x="6099103" y="1792715"/>
-            <a:ext cx="4879648" cy="4070433"/>
+            <a:off x="6601987" y="1792716"/>
+            <a:ext cx="4875857" cy="4070432"/>
           </a:xfrm>
           <a:prstGeom prst="rect">
             <a:avLst/>
@@ -12072,10 +12072,10 @@
       </p:sp>
       <p:pic>
         <p:nvPicPr>
-          <p:cNvPr id="3" name="Picture 4" descr="Chart, scatter chart&#10;&#10;Description automatically generated">
-            <a:extLst>
-              <a:ext uri="{FF2B5EF4-FFF2-40B4-BE49-F238E27FC236}">
-                <a16:creationId xmlns:a16="http://schemas.microsoft.com/office/drawing/2014/main" id="{6019216D-C886-0924-40E4-C54ADB02F15C}"/>
+          <p:cNvPr id="6" name="Picture 5" descr="Chart, scatter chart&#10;&#10;Description automatically generated">
+            <a:extLst>
+              <a:ext uri="{FF2B5EF4-FFF2-40B4-BE49-F238E27FC236}">
+                <a16:creationId xmlns:a16="http://schemas.microsoft.com/office/drawing/2014/main" id="{63A43851-CE1A-A168-FE2F-C73177593CFA}"/>
               </a:ext>
             </a:extLst>
           </p:cNvPr>
@@ -12092,8 +12092,8 @@
         </p:blipFill>
         <p:spPr>
           <a:xfrm>
-            <a:off x="1212866" y="1786963"/>
-            <a:ext cx="4879648" cy="4063675"/>
+            <a:off x="868083" y="1789027"/>
+            <a:ext cx="4927846" cy="4063312"/>
           </a:xfrm>
           <a:prstGeom prst="rect">
             <a:avLst/>
@@ -12102,10 +12102,10 @@
       </p:pic>
       <p:pic>
         <p:nvPicPr>
-          <p:cNvPr id="5" name="Picture 5" descr="Chart, scatter chart&#10;&#10;Description automatically generated">
-            <a:extLst>
-              <a:ext uri="{FF2B5EF4-FFF2-40B4-BE49-F238E27FC236}">
-                <a16:creationId xmlns:a16="http://schemas.microsoft.com/office/drawing/2014/main" id="{87B42BF0-EF23-23A9-B608-1463DA96369E}"/>
+          <p:cNvPr id="9" name="Picture 8" descr="Chart, scatter chart&#10;&#10;Description automatically generated">
+            <a:extLst>
+              <a:ext uri="{FF2B5EF4-FFF2-40B4-BE49-F238E27FC236}">
+                <a16:creationId xmlns:a16="http://schemas.microsoft.com/office/drawing/2014/main" id="{2077AA4B-2982-3A42-C16D-ED9B7D49DDE2}"/>
               </a:ext>
             </a:extLst>
           </p:cNvPr>
@@ -12122,8 +12122,8 @@
         </p:blipFill>
         <p:spPr>
           <a:xfrm>
-            <a:off x="6095733" y="1789027"/>
-            <a:ext cx="4886770" cy="4063312"/>
+            <a:off x="6396073" y="1789027"/>
+            <a:ext cx="4867328" cy="4063312"/>
           </a:xfrm>
           <a:prstGeom prst="rect">
             <a:avLst/>
@@ -12325,10 +12325,10 @@
       </p:sp>
       <p:pic>
         <p:nvPicPr>
-          <p:cNvPr id="3" name="Picture 4" descr="Chart, scatter chart&#10;&#10;Description automatically generated">
-            <a:extLst>
-              <a:ext uri="{FF2B5EF4-FFF2-40B4-BE49-F238E27FC236}">
-                <a16:creationId xmlns:a16="http://schemas.microsoft.com/office/drawing/2014/main" id="{C8D171A4-7DF9-9A8B-6419-3161017F546E}"/>
+          <p:cNvPr id="6" name="Picture 5" descr="Chart, scatter chart&#10;&#10;Description automatically generated">
+            <a:extLst>
+              <a:ext uri="{FF2B5EF4-FFF2-40B4-BE49-F238E27FC236}">
+                <a16:creationId xmlns:a16="http://schemas.microsoft.com/office/drawing/2014/main" id="{5F08AEB9-78FA-ECEB-7A45-7F3105C930C7}"/>
               </a:ext>
             </a:extLst>
           </p:cNvPr>
@@ -12345,8 +12345,8 @@
         </p:blipFill>
         <p:spPr>
           <a:xfrm>
-            <a:off x="1213271" y="1792992"/>
-            <a:ext cx="4879648" cy="4070433"/>
+            <a:off x="711770" y="1790298"/>
+            <a:ext cx="4867330" cy="4063313"/>
           </a:xfrm>
           <a:prstGeom prst="rect">
             <a:avLst/>
@@ -12355,10 +12355,10 @@
       </p:pic>
       <p:pic>
         <p:nvPicPr>
-          <p:cNvPr id="5" name="Picture 5" descr="Chart, scatter chart&#10;&#10;Description automatically generated">
-            <a:extLst>
-              <a:ext uri="{FF2B5EF4-FFF2-40B4-BE49-F238E27FC236}">
-                <a16:creationId xmlns:a16="http://schemas.microsoft.com/office/drawing/2014/main" id="{0E2B1265-A5B5-99C2-7288-AACD470F4C97}"/>
+          <p:cNvPr id="9" name="Picture 8" descr="Chart, scatter chart&#10;&#10;Description automatically generated">
+            <a:extLst>
+              <a:ext uri="{FF2B5EF4-FFF2-40B4-BE49-F238E27FC236}">
+                <a16:creationId xmlns:a16="http://schemas.microsoft.com/office/drawing/2014/main" id="{ABCE79B5-D673-36AA-8912-1F2AFCF400DB}"/>
               </a:ext>
             </a:extLst>
           </p:cNvPr>
@@ -12375,8 +12375,8 @@
         </p:blipFill>
         <p:spPr>
           <a:xfrm>
-            <a:off x="6099993" y="1790298"/>
-            <a:ext cx="4886770" cy="4063312"/>
+            <a:off x="6091046" y="1790298"/>
+            <a:ext cx="4867330" cy="4063313"/>
           </a:xfrm>
           <a:prstGeom prst="rect">
             <a:avLst/>
@@ -16526,15 +16526,6 @@
 </file>
 
 <file path=customXml/item1.xml><?xml version="1.0" encoding="utf-8"?>
-<?mso-contentType ?>
-<FormTemplates xmlns="http://schemas.microsoft.com/sharepoint/v3/contenttype/forms">
-  <Display>DocumentLibraryForm</Display>
-  <Edit>DocumentLibraryForm</Edit>
-  <New>DocumentLibraryForm</New>
-</FormTemplates>
-</file>
-
-<file path=customXml/item2.xml><?xml version="1.0" encoding="utf-8"?>
 <p:properties xmlns:p="http://schemas.microsoft.com/office/2006/metadata/properties" xmlns:xsi="http://www.w3.org/2001/XMLSchema-instance" xmlns:pc="http://schemas.microsoft.com/office/infopath/2007/PartnerControls">
   <documentManagement>
     <_ip_UnifiedCompliancePolicyUIAction xmlns="http://schemas.microsoft.com/sharepoint/v3" xsi:nil="true"/>
@@ -16551,6 +16542,15 @@
     <MediaServiceKeyPoints xmlns="71af3243-3dd4-4a8d-8c0d-dd76da1f02a5" xsi:nil="true"/>
   </documentManagement>
 </p:properties>
+</file>
+
+<file path=customXml/item2.xml><?xml version="1.0" encoding="utf-8"?>
+<?mso-contentType ?>
+<FormTemplates xmlns="http://schemas.microsoft.com/sharepoint/v3/contenttype/forms">
+  <Display>DocumentLibraryForm</Display>
+  <Edit>DocumentLibraryForm</Edit>
+  <New>DocumentLibraryForm</New>
+</FormTemplates>
 </file>
 
 <file path=customXml/item3.xml><?xml version="1.0" encoding="utf-8"?>
@@ -16830,14 +16830,6 @@
 </file>
 
 <file path=customXml/itemProps1.xml><?xml version="1.0" encoding="utf-8"?>
-<ds:datastoreItem xmlns:ds="http://schemas.openxmlformats.org/officeDocument/2006/customXml" ds:itemID="{BD5826B4-4DD2-4A9B-8D6D-E91CF9C2316C}">
-  <ds:schemaRefs>
-    <ds:schemaRef ds:uri="http://schemas.microsoft.com/sharepoint/v3/contenttype/forms"/>
-  </ds:schemaRefs>
-</ds:datastoreItem>
-</file>
-
-<file path=customXml/itemProps2.xml><?xml version="1.0" encoding="utf-8"?>
 <ds:datastoreItem xmlns:ds="http://schemas.openxmlformats.org/officeDocument/2006/customXml" ds:itemID="{4CC7F809-A434-4A8D-A127-1C50C2DB3890}">
   <ds:schemaRefs>
     <ds:schemaRef ds:uri="230e9df3-be65-4c73-a93b-d1236ebd677e"/>
@@ -16845,6 +16837,14 @@
     <ds:schemaRef ds:uri="http://schemas.microsoft.com/office/2006/metadata/properties"/>
     <ds:schemaRef ds:uri="http://schemas.microsoft.com/office/infopath/2007/PartnerControls"/>
     <ds:schemaRef ds:uri="http://schemas.microsoft.com/sharepoint/v3"/>
+  </ds:schemaRefs>
+</ds:datastoreItem>
+</file>
+
+<file path=customXml/itemProps2.xml><?xml version="1.0" encoding="utf-8"?>
+<ds:datastoreItem xmlns:ds="http://schemas.openxmlformats.org/officeDocument/2006/customXml" ds:itemID="{BD5826B4-4DD2-4A9B-8D6D-E91CF9C2316C}">
+  <ds:schemaRefs>
+    <ds:schemaRef ds:uri="http://schemas.microsoft.com/sharepoint/v3/contenttype/forms"/>
   </ds:schemaRefs>
 </ds:datastoreItem>
 </file>

</xml_diff>

<commit_message>
updated data collection and cleanup slide
</commit_message>
<xml_diff>
--- a/Population Density Relationship Analysis.pptx
+++ b/Population Density Relationship Analysis.pptx
@@ -249,7 +249,7 @@
           <a:p>
             <a:fld id="{B56F32FC-4BD9-442A-A8C6-51598C909FE3}" type="datetimeFigureOut">
               <a:rPr lang="en-US" smtClean="0"/>
-              <a:t>5/3/2023</a:t>
+              <a:t>5/4/2023</a:t>
             </a:fld>
             <a:endParaRPr lang="en-US"/>
           </a:p>
@@ -426,7 +426,7 @@
           <a:p>
             <a:fld id="{056371FA-A98D-41E8-93F4-09945841298A}" type="datetimeFigureOut">
               <a:rPr lang="en-US" smtClean="0"/>
-              <a:t>5/3/2023</a:t>
+              <a:t>5/4/2023</a:t>
             </a:fld>
             <a:endParaRPr lang="en-US"/>
           </a:p>
@@ -14213,13 +14213,13 @@
           <a:lstStyle/>
           <a:p>
             <a:r>
-              <a:rPr lang="en-US"/>
+              <a:rPr lang="en-US" dirty="0"/>
               <a:t>US County Level Census:</a:t>
             </a:r>
           </a:p>
           <a:p>
             <a:r>
-              <a:rPr lang="en-US">
+              <a:rPr lang="en-US" dirty="0">
                 <a:ea typeface="+mn-lt"/>
                 <a:cs typeface="+mn-lt"/>
                 <a:hlinkClick r:id="rId3"/>
@@ -14227,7 +14227,7 @@
               <a:t>https://www.ers.usda.gov/data-products/county-level-data-sets/</a:t>
             </a:r>
             <a:r>
-              <a:rPr lang="en-US">
+              <a:rPr lang="en-US" dirty="0">
                 <a:ea typeface="+mn-lt"/>
                 <a:cs typeface="+mn-lt"/>
               </a:rPr>
@@ -14236,13 +14236,61 @@
           </a:p>
           <a:p>
             <a:r>
-              <a:rPr lang="en-US" u="sng"/>
+              <a:rPr lang="en-US" u="sng" dirty="0"/>
               <a:t>Issue Experienced</a:t>
             </a:r>
             <a:r>
-              <a:rPr lang="en-US"/>
+              <a:rPr lang="en-US" dirty="0"/>
               <a:t>: When using this site, it is MUCH easier to use if the census wrapper is used as well.</a:t>
             </a:r>
+          </a:p>
+          <a:p>
+            <a:r>
+              <a:rPr lang="en-US" dirty="0"/>
+              <a:t>Department of Agriculture Website </a:t>
+            </a:r>
+          </a:p>
+          <a:p>
+            <a:r>
+              <a:rPr lang="en-US" b="0" dirty="0">
+                <a:solidFill>
+                  <a:srgbClr val="55B4D4"/>
+                </a:solidFill>
+                <a:effectLst/>
+                <a:latin typeface="Consolas" panose="020B0609020204030204" pitchFamily="49" charset="0"/>
+                <a:hlinkClick r:id="rId3"/>
+              </a:rPr>
+              <a:t>https://www.ers.usda.gov/data-products/</a:t>
+            </a:r>
+            <a:r>
+              <a:rPr lang="en-US" b="0">
+                <a:solidFill>
+                  <a:srgbClr val="55B4D4"/>
+                </a:solidFill>
+                <a:effectLst/>
+                <a:latin typeface="Consolas" panose="020B0609020204030204" pitchFamily="49" charset="0"/>
+                <a:hlinkClick r:id="rId3"/>
+              </a:rPr>
+              <a:t>county-level-data-sets/</a:t>
+            </a:r>
+            <a:endParaRPr lang="en-US">
+              <a:solidFill>
+                <a:srgbClr val="5C6166"/>
+              </a:solidFill>
+              <a:latin typeface="Consolas" panose="020B0609020204030204" pitchFamily="49" charset="0"/>
+            </a:endParaRPr>
+          </a:p>
+          <a:p>
+            <a:endParaRPr lang="en-US" b="0" dirty="0">
+              <a:solidFill>
+                <a:srgbClr val="5C6166"/>
+              </a:solidFill>
+              <a:effectLst/>
+              <a:latin typeface="Consolas" panose="020B0609020204030204" pitchFamily="49" charset="0"/>
+            </a:endParaRPr>
+          </a:p>
+          <a:p>
+            <a:endParaRPr lang="en-US" dirty="0"/>
           </a:p>
         </p:txBody>
       </p:sp>
@@ -16545,15 +16593,6 @@
 </file>
 
 <file path=customXml/item2.xml><?xml version="1.0" encoding="utf-8"?>
-<?mso-contentType ?>
-<FormTemplates xmlns="http://schemas.microsoft.com/sharepoint/v3/contenttype/forms">
-  <Display>DocumentLibraryForm</Display>
-  <Edit>DocumentLibraryForm</Edit>
-  <New>DocumentLibraryForm</New>
-</FormTemplates>
-</file>
-
-<file path=customXml/item3.xml><?xml version="1.0" encoding="utf-8"?>
 <ct:contentTypeSchema xmlns:ct="http://schemas.microsoft.com/office/2006/metadata/contentType" xmlns:ma="http://schemas.microsoft.com/office/2006/metadata/properties/metaAttributes" ct:_="" ma:_="" ma:contentTypeName="Document" ma:contentTypeID="0x01010079F111ED35F8CC479449609E8A0923A6" ma:contentTypeVersion="20" ma:contentTypeDescription="Create a new document." ma:contentTypeScope="" ma:versionID="1267097ee5f5874adfcc408041ae252e">
   <xsd:schema xmlns:xsd="http://www.w3.org/2001/XMLSchema" xmlns:xs="http://www.w3.org/2001/XMLSchema" xmlns:p="http://schemas.microsoft.com/office/2006/metadata/properties" xmlns:ns1="http://schemas.microsoft.com/sharepoint/v3" xmlns:ns2="71af3243-3dd4-4a8d-8c0d-dd76da1f02a5" xmlns:ns3="16c05727-aa75-4e4a-9b5f-8a80a1165891" xmlns:ns4="230e9df3-be65-4c73-a93b-d1236ebd677e" targetNamespace="http://schemas.microsoft.com/office/2006/metadata/properties" ma:root="true" ma:fieldsID="395891a93df65b14727750f2c06c306c" ns1:_="" ns2:_="" ns3:_="" ns4:_="">
     <xsd:import namespace="http://schemas.microsoft.com/sharepoint/v3"/>
@@ -16829,6 +16868,15 @@
 </ct:contentTypeSchema>
 </file>
 
+<file path=customXml/item3.xml><?xml version="1.0" encoding="utf-8"?>
+<?mso-contentType ?>
+<FormTemplates xmlns="http://schemas.microsoft.com/sharepoint/v3/contenttype/forms">
+  <Display>DocumentLibraryForm</Display>
+  <Edit>DocumentLibraryForm</Edit>
+  <New>DocumentLibraryForm</New>
+</FormTemplates>
+</file>
+
 <file path=customXml/itemProps1.xml><?xml version="1.0" encoding="utf-8"?>
 <ds:datastoreItem xmlns:ds="http://schemas.openxmlformats.org/officeDocument/2006/customXml" ds:itemID="{4CC7F809-A434-4A8D-A127-1C50C2DB3890}">
   <ds:schemaRefs>
@@ -16842,14 +16890,6 @@
 </file>
 
 <file path=customXml/itemProps2.xml><?xml version="1.0" encoding="utf-8"?>
-<ds:datastoreItem xmlns:ds="http://schemas.openxmlformats.org/officeDocument/2006/customXml" ds:itemID="{BD5826B4-4DD2-4A9B-8D6D-E91CF9C2316C}">
-  <ds:schemaRefs>
-    <ds:schemaRef ds:uri="http://schemas.microsoft.com/sharepoint/v3/contenttype/forms"/>
-  </ds:schemaRefs>
-</ds:datastoreItem>
-</file>
-
-<file path=customXml/itemProps3.xml><?xml version="1.0" encoding="utf-8"?>
 <ds:datastoreItem xmlns:ds="http://schemas.openxmlformats.org/officeDocument/2006/customXml" ds:itemID="{4DC6F004-8F9D-4F40-8394-6C4C67F70915}">
   <ds:schemaRefs>
     <ds:schemaRef ds:uri="16c05727-aa75-4e4a-9b5f-8a80a1165891"/>
@@ -16870,6 +16910,14 @@
 </ds:datastoreItem>
 </file>
 
+<file path=customXml/itemProps3.xml><?xml version="1.0" encoding="utf-8"?>
+<ds:datastoreItem xmlns:ds="http://schemas.openxmlformats.org/officeDocument/2006/customXml" ds:itemID="{BD5826B4-4DD2-4A9B-8D6D-E91CF9C2316C}">
+  <ds:schemaRefs>
+    <ds:schemaRef ds:uri="http://schemas.microsoft.com/sharepoint/v3/contenttype/forms"/>
+  </ds:schemaRefs>
+</ds:datastoreItem>
+</file>
+
 <file path=docMetadata/LabelInfo.xml><?xml version="1.0" encoding="utf-8"?>
 <clbl:labelList xmlns:clbl="http://schemas.microsoft.com/office/2020/mipLabelMetadata">
   <clbl:label id="{f42aa342-8706-4288-bd11-ebb85995028c}" enabled="1" method="Standard" siteId="{72f988bf-86f1-41af-91ab-2d7cd011db47}" removed="0"/>

</xml_diff>